<commit_message>
fixed KDF reference to most current NIST
</commit_message>
<xml_diff>
--- a/lab9/Lab9_Summary.pptx
+++ b/lab9/Lab9_Summary.pptx
@@ -10015,7 +10015,7 @@
           <a:p>
             <a:fld id="{5EBAC800-55C1-4C70-9591-A1AC9479D98B}" type="datetimeFigureOut">
               <a:rPr lang="en-US" smtClean="0"/>
-              <a:t>4/12/2023</a:t>
+              <a:t>4/24/2023</a:t>
             </a:fld>
             <a:endParaRPr lang="en-US"/>
           </a:p>
@@ -10185,7 +10185,7 @@
           <a:p>
             <a:fld id="{5EBAC800-55C1-4C70-9591-A1AC9479D98B}" type="datetimeFigureOut">
               <a:rPr lang="en-US" smtClean="0"/>
-              <a:t>4/12/2023</a:t>
+              <a:t>4/24/2023</a:t>
             </a:fld>
             <a:endParaRPr lang="en-US"/>
           </a:p>
@@ -10365,7 +10365,7 @@
           <a:p>
             <a:fld id="{5EBAC800-55C1-4C70-9591-A1AC9479D98B}" type="datetimeFigureOut">
               <a:rPr lang="en-US" smtClean="0"/>
-              <a:t>4/12/2023</a:t>
+              <a:t>4/24/2023</a:t>
             </a:fld>
             <a:endParaRPr lang="en-US"/>
           </a:p>
@@ -10535,7 +10535,7 @@
           <a:p>
             <a:fld id="{5EBAC800-55C1-4C70-9591-A1AC9479D98B}" type="datetimeFigureOut">
               <a:rPr lang="en-US" smtClean="0"/>
-              <a:t>4/12/2023</a:t>
+              <a:t>4/24/2023</a:t>
             </a:fld>
             <a:endParaRPr lang="en-US"/>
           </a:p>
@@ -10779,7 +10779,7 @@
           <a:p>
             <a:fld id="{5EBAC800-55C1-4C70-9591-A1AC9479D98B}" type="datetimeFigureOut">
               <a:rPr lang="en-US" smtClean="0"/>
-              <a:t>4/12/2023</a:t>
+              <a:t>4/24/2023</a:t>
             </a:fld>
             <a:endParaRPr lang="en-US"/>
           </a:p>
@@ -11011,7 +11011,7 @@
           <a:p>
             <a:fld id="{5EBAC800-55C1-4C70-9591-A1AC9479D98B}" type="datetimeFigureOut">
               <a:rPr lang="en-US" smtClean="0"/>
-              <a:t>4/12/2023</a:t>
+              <a:t>4/24/2023</a:t>
             </a:fld>
             <a:endParaRPr lang="en-US"/>
           </a:p>
@@ -11378,7 +11378,7 @@
           <a:p>
             <a:fld id="{5EBAC800-55C1-4C70-9591-A1AC9479D98B}" type="datetimeFigureOut">
               <a:rPr lang="en-US" smtClean="0"/>
-              <a:t>4/12/2023</a:t>
+              <a:t>4/24/2023</a:t>
             </a:fld>
             <a:endParaRPr lang="en-US"/>
           </a:p>
@@ -11496,7 +11496,7 @@
           <a:p>
             <a:fld id="{5EBAC800-55C1-4C70-9591-A1AC9479D98B}" type="datetimeFigureOut">
               <a:rPr lang="en-US" smtClean="0"/>
-              <a:t>4/12/2023</a:t>
+              <a:t>4/24/2023</a:t>
             </a:fld>
             <a:endParaRPr lang="en-US"/>
           </a:p>
@@ -11591,7 +11591,7 @@
           <a:p>
             <a:fld id="{5EBAC800-55C1-4C70-9591-A1AC9479D98B}" type="datetimeFigureOut">
               <a:rPr lang="en-US" smtClean="0"/>
-              <a:t>4/12/2023</a:t>
+              <a:t>4/24/2023</a:t>
             </a:fld>
             <a:endParaRPr lang="en-US"/>
           </a:p>
@@ -11868,7 +11868,7 @@
           <a:p>
             <a:fld id="{5EBAC800-55C1-4C70-9591-A1AC9479D98B}" type="datetimeFigureOut">
               <a:rPr lang="en-US" smtClean="0"/>
-              <a:t>4/12/2023</a:t>
+              <a:t>4/24/2023</a:t>
             </a:fld>
             <a:endParaRPr lang="en-US"/>
           </a:p>
@@ -12125,7 +12125,7 @@
           <a:p>
             <a:fld id="{5EBAC800-55C1-4C70-9591-A1AC9479D98B}" type="datetimeFigureOut">
               <a:rPr lang="en-US" smtClean="0"/>
-              <a:t>4/12/2023</a:t>
+              <a:t>4/24/2023</a:t>
             </a:fld>
             <a:endParaRPr lang="en-US"/>
           </a:p>
@@ -12338,7 +12338,7 @@
           <a:p>
             <a:fld id="{5EBAC800-55C1-4C70-9591-A1AC9479D98B}" type="datetimeFigureOut">
               <a:rPr lang="en-US" smtClean="0"/>
-              <a:t>4/12/2023</a:t>
+              <a:t>4/24/2023</a:t>
             </a:fld>
             <a:endParaRPr lang="en-US"/>
           </a:p>
@@ -43541,7 +43541,7 @@
                 </a:solidFill>
                 <a:latin typeface="Arial Narrow" panose="020B0606020202030204" pitchFamily="34" charset="0"/>
               </a:rPr>
-              <a:t>NIST 800-56Ar2</a:t>
+              <a:t>NIST 800-56Ar3</a:t>
             </a:r>
           </a:p>
         </p:txBody>

</xml_diff>